<commit_message>
Update 02. Immobweb - Machine Learning.pptx
</commit_message>
<xml_diff>
--- a/deck/02. Immobweb - Machine Learning.pptx
+++ b/deck/02. Immobweb - Machine Learning.pptx
@@ -1365,7 +1365,7 @@
             </a:pPr>
             <a:r>
               <a:rPr lang="en-US" i="1" dirty="0"/>
-              <a:t>	-&gt;each part is used once for validation while the others are used for training).</a:t>
+              <a:t>	-&gt;each part is used once for validation while the others are used for training.</a:t>
             </a:r>
             <a:br>
               <a:rPr lang="en-US" dirty="0"/>
@@ -1378,8 +1378,12 @@
               <a:buNone/>
             </a:pPr>
             <a:r>
+              <a:rPr lang="en-US" b="1" dirty="0"/>
+              <a:t>The test set stayed untouched </a:t>
+            </a:r>
+            <a:r>
               <a:rPr lang="en-US" dirty="0"/>
-              <a:t>The test set stayed untouched until final evaluation.</a:t>
+              <a:t>until final evaluation.</a:t>
             </a:r>
             <a:br>
               <a:rPr lang="en-US" dirty="0"/>
@@ -1540,7 +1544,11 @@
             </a:pPr>
             <a:r>
               <a:rPr lang="en-US" dirty="0"/>
-              <a:t>    -&gt; and test if fewer features could still give good results"</a:t>
+              <a:t>    -&gt; and </a:t>
+            </a:r>
+            <a:r>
+              <a:rPr lang="en-US" b="1" dirty="0"/>
+              <a:t>test if fewer features could still give good results</a:t>
             </a:r>
           </a:p>
           <a:p>
@@ -1690,11 +1698,7 @@
             </a:r>
             <a:r>
               <a:rPr lang="fr-BE" b="1" dirty="0"/>
-              <a:t>0.81 R²</a:t>
-            </a:r>
-            <a:r>
-              <a:rPr lang="fr-BE" dirty="0"/>
-              <a:t> </a:t>
+              <a:t>0.81 R²_test &amp; 0,92 R2_test </a:t>
             </a:r>
             <a:r>
               <a:rPr lang="fr-BE" dirty="0" err="1"/>
@@ -1761,6 +1765,12 @@
               <a:rPr lang="fr-BE" dirty="0"/>
               <a:t>good train performance, </a:t>
             </a:r>
+          </a:p>
+          <a:p>
+            <a:pPr marL="628650" lvl="1" indent="-171450">
+              <a:buFont typeface="Wingdings" panose="05000000000000000000" pitchFamily="2" charset="2"/>
+              <a:buChar char="è"/>
+            </a:pPr>
             <a:r>
               <a:rPr lang="fr-BE" dirty="0" err="1"/>
               <a:t>slightly</a:t>
@@ -1785,7 +1795,17 @@
             </a:pPr>
             <a:r>
               <a:rPr lang="en-US" dirty="0"/>
-              <a:t>The model captures useful patterns but also some noise, leading to </a:t>
+              <a:t>The model captures useful patterns </a:t>
+            </a:r>
+          </a:p>
+          <a:p>
+            <a:pPr marL="628650" lvl="1" indent="-171450">
+              <a:buFont typeface="Wingdings" panose="05000000000000000000" pitchFamily="2" charset="2"/>
+              <a:buChar char="è"/>
+            </a:pPr>
+            <a:r>
+              <a:rPr lang="en-US" dirty="0"/>
+              <a:t>but also some noise, leading to </a:t>
             </a:r>
             <a:r>
               <a:rPr lang="en-US" b="1" dirty="0"/>
@@ -1793,7 +1813,7 @@
             </a:r>
             <a:r>
               <a:rPr lang="en-US" dirty="0"/>
-              <a:t>.</a:t>
+              <a:t>. (R2 gap is 0.1)</a:t>
             </a:r>
             <a:endParaRPr lang="fr-BE" dirty="0"/>
           </a:p>
@@ -1997,7 +2017,17 @@
             </a:r>
             <a:r>
               <a:rPr lang="en-US" i="1" dirty="0"/>
-              <a:t>the model is learning patterns that are specific to the training data,  including random</a:t>
+              <a:t>the model is learning patterns that are specific to the training data,  </a:t>
+            </a:r>
+            <a:r>
+              <a:rPr lang="en-US" i="1" dirty="0">
+                <a:sym typeface="Wingdings" panose="05000000000000000000" pitchFamily="2" charset="2"/>
+              </a:rPr>
+              <a:t> </a:t>
+            </a:r>
+            <a:r>
+              <a:rPr lang="en-US" i="1" dirty="0"/>
+              <a:t>including random</a:t>
             </a:r>
           </a:p>
           <a:p>
@@ -2015,7 +2045,52 @@
                   <a:schemeClr val="tx2"/>
                 </a:solidFill>
               </a:rPr>
-              <a:t>implies the model does not generalize well.</a:t>
+              <a:t>implies the model does not generalize well</a:t>
+            </a:r>
+            <a:endParaRPr lang="en-US" sz="1200" b="1" i="1" dirty="0">
+              <a:solidFill>
+                <a:schemeClr val="tx2"/>
+              </a:solidFill>
+            </a:endParaRPr>
+          </a:p>
+          <a:p>
+            <a:pPr marL="0" indent="0">
+              <a:buFont typeface="Arial" panose="020B0604020202020204" pitchFamily="34" charset="0"/>
+              <a:buNone/>
+            </a:pPr>
+            <a:r>
+              <a:rPr lang="en-US" sz="1200" b="1" i="1" dirty="0">
+                <a:solidFill>
+                  <a:schemeClr val="tx2"/>
+                </a:solidFill>
+              </a:rPr>
+              <a:t>   -&gt; </a:t>
+            </a:r>
+            <a:r>
+              <a:rPr lang="en-US" dirty="0"/>
+              <a:t>The model learns patterns </a:t>
+            </a:r>
+            <a:r>
+              <a:rPr lang="en-US" b="1" dirty="0"/>
+              <a:t>specific to training data</a:t>
+            </a:r>
+            <a:r>
+              <a:rPr lang="en-US" dirty="0"/>
+              <a:t>, including noise.</a:t>
+            </a:r>
+          </a:p>
+          <a:p>
+            <a:pPr marL="0" indent="0">
+              <a:buFont typeface="Arial" panose="020B0604020202020204" pitchFamily="34" charset="0"/>
+              <a:buNone/>
+            </a:pPr>
+            <a:r>
+              <a:rPr lang="en-US" sz="1200" b="1" i="1" dirty="0">
+                <a:solidFill>
+                  <a:schemeClr val="tx2"/>
+                </a:solidFill>
+              </a:rPr>
+              <a:t>   -&gt; (it strongly overfits)</a:t>
             </a:r>
           </a:p>
           <a:p>
@@ -2119,6 +2194,9 @@
               <a:rPr lang="fr-BE" i="1" dirty="0"/>
               <a:t> structure.</a:t>
             </a:r>
+          </a:p>
+          <a:p>
+            <a:endParaRPr lang="en-US" dirty="0"/>
           </a:p>
           <a:p>
             <a:endParaRPr lang="en-US" dirty="0"/>
@@ -18644,7 +18722,7 @@
         </p:nvSpPr>
         <p:spPr>
           <a:xfrm>
-            <a:off x="262969" y="3875238"/>
+            <a:off x="262969" y="4198288"/>
             <a:ext cx="5737701" cy="2490002"/>
           </a:xfrm>
           <a:prstGeom prst="roundRect">
@@ -18692,7 +18770,7 @@
         </p:nvSpPr>
         <p:spPr>
           <a:xfrm>
-            <a:off x="6191329" y="3875238"/>
+            <a:off x="6191329" y="4198288"/>
             <a:ext cx="5737701" cy="2490002"/>
           </a:xfrm>
           <a:prstGeom prst="roundRect">
@@ -18740,7 +18818,7 @@
         </p:nvSpPr>
         <p:spPr>
           <a:xfrm>
-            <a:off x="6497217" y="4119862"/>
+            <a:off x="6497217" y="4442912"/>
             <a:ext cx="5318964" cy="1938992"/>
           </a:xfrm>
           <a:prstGeom prst="rect">
@@ -18895,7 +18973,7 @@
         </p:nvSpPr>
         <p:spPr>
           <a:xfrm>
-            <a:off x="472339" y="3966077"/>
+            <a:off x="472339" y="4289127"/>
             <a:ext cx="5318964" cy="2308324"/>
           </a:xfrm>
           <a:prstGeom prst="rect">
@@ -19244,8 +19322,8 @@
         </p:blipFill>
         <p:spPr bwMode="auto">
           <a:xfrm>
-            <a:off x="1280261" y="620562"/>
-            <a:ext cx="8752739" cy="3129560"/>
+            <a:off x="1307638" y="620561"/>
+            <a:ext cx="9660229" cy="3454035"/>
           </a:xfrm>
           <a:prstGeom prst="rect">
             <a:avLst/>
@@ -19711,21 +19789,56 @@
                   <a:schemeClr val="accent1"/>
                 </a:solidFill>
               </a:rPr>
-              <a:t>Achieving stable and reliable tuning results took more iterations than expected, and the process is still not </a:t>
-            </a:r>
-            <a:r>
-              <a:rPr lang="en-US">
+              <a:t>Achieving </a:t>
+            </a:r>
+            <a:r>
+              <a:rPr lang="en-US" b="1" dirty="0">
                 <a:solidFill>
                   <a:schemeClr val="accent1"/>
                 </a:solidFill>
               </a:rPr>
-              <a:t>fully optimized</a:t>
-            </a:r>
-            <a:endParaRPr lang="en-US" dirty="0">
-              <a:solidFill>
-                <a:schemeClr val="accent1"/>
-              </a:solidFill>
-            </a:endParaRPr>
+              <a:t>stable</a:t>
+            </a:r>
+            <a:r>
+              <a:rPr lang="en-US" dirty="0">
+                <a:solidFill>
+                  <a:schemeClr val="accent1"/>
+                </a:solidFill>
+              </a:rPr>
+              <a:t> and </a:t>
+            </a:r>
+            <a:r>
+              <a:rPr lang="en-US" b="1" dirty="0">
+                <a:solidFill>
+                  <a:schemeClr val="accent1"/>
+                </a:solidFill>
+              </a:rPr>
+              <a:t>reliable tuning </a:t>
+            </a:r>
+            <a:r>
+              <a:rPr lang="en-US" dirty="0">
+                <a:solidFill>
+                  <a:schemeClr val="accent1"/>
+                </a:solidFill>
+              </a:rPr>
+              <a:t>results </a:t>
+            </a:r>
+            <a:r>
+              <a:rPr lang="en-US" b="1" dirty="0">
+                <a:solidFill>
+                  <a:schemeClr val="accent1"/>
+                </a:solidFill>
+              </a:rPr>
+              <a:t>took more iterations than expected</a:t>
+            </a:r>
+            <a:r>
+              <a:rPr lang="en-US" dirty="0">
+                <a:solidFill>
+                  <a:schemeClr val="accent1"/>
+                </a:solidFill>
+              </a:rPr>
+              <a:t>, and the process is still not fully optimized</a:t>
+            </a:r>
           </a:p>
           <a:p>
             <a:pPr marL="285750" indent="-285750">

</xml_diff>